<commit_message>
new picture timeline fitbit
</commit_message>
<xml_diff>
--- a/02_paper/02_study/02_fitbit paper/timeline_fitbit_data_collection.pptx
+++ b/02_paper/02_study/02_fitbit paper/timeline_fitbit_data_collection.pptx
@@ -243,7 +243,7 @@
           <a:p>
             <a:fld id="{C5164158-0CE9-4349-B3F5-2F2E57F0D0CB}" type="datetimeFigureOut">
               <a:rPr lang="en-US" smtClean="0"/>
-              <a:t>11/21/2022</a:t>
+              <a:t>11/22/2022</a:t>
             </a:fld>
             <a:endParaRPr lang="en-US"/>
           </a:p>
@@ -413,7 +413,7 @@
           <a:p>
             <a:fld id="{C5164158-0CE9-4349-B3F5-2F2E57F0D0CB}" type="datetimeFigureOut">
               <a:rPr lang="en-US" smtClean="0"/>
-              <a:t>11/21/2022</a:t>
+              <a:t>11/22/2022</a:t>
             </a:fld>
             <a:endParaRPr lang="en-US"/>
           </a:p>
@@ -593,7 +593,7 @@
           <a:p>
             <a:fld id="{C5164158-0CE9-4349-B3F5-2F2E57F0D0CB}" type="datetimeFigureOut">
               <a:rPr lang="en-US" smtClean="0"/>
-              <a:t>11/21/2022</a:t>
+              <a:t>11/22/2022</a:t>
             </a:fld>
             <a:endParaRPr lang="en-US"/>
           </a:p>
@@ -763,7 +763,7 @@
           <a:p>
             <a:fld id="{C5164158-0CE9-4349-B3F5-2F2E57F0D0CB}" type="datetimeFigureOut">
               <a:rPr lang="en-US" smtClean="0"/>
-              <a:t>11/21/2022</a:t>
+              <a:t>11/22/2022</a:t>
             </a:fld>
             <a:endParaRPr lang="en-US"/>
           </a:p>
@@ -1009,7 +1009,7 @@
           <a:p>
             <a:fld id="{C5164158-0CE9-4349-B3F5-2F2E57F0D0CB}" type="datetimeFigureOut">
               <a:rPr lang="en-US" smtClean="0"/>
-              <a:t>11/21/2022</a:t>
+              <a:t>11/22/2022</a:t>
             </a:fld>
             <a:endParaRPr lang="en-US"/>
           </a:p>
@@ -1241,7 +1241,7 @@
           <a:p>
             <a:fld id="{C5164158-0CE9-4349-B3F5-2F2E57F0D0CB}" type="datetimeFigureOut">
               <a:rPr lang="en-US" smtClean="0"/>
-              <a:t>11/21/2022</a:t>
+              <a:t>11/22/2022</a:t>
             </a:fld>
             <a:endParaRPr lang="en-US"/>
           </a:p>
@@ -1608,7 +1608,7 @@
           <a:p>
             <a:fld id="{C5164158-0CE9-4349-B3F5-2F2E57F0D0CB}" type="datetimeFigureOut">
               <a:rPr lang="en-US" smtClean="0"/>
-              <a:t>11/21/2022</a:t>
+              <a:t>11/22/2022</a:t>
             </a:fld>
             <a:endParaRPr lang="en-US"/>
           </a:p>
@@ -1726,7 +1726,7 @@
           <a:p>
             <a:fld id="{C5164158-0CE9-4349-B3F5-2F2E57F0D0CB}" type="datetimeFigureOut">
               <a:rPr lang="en-US" smtClean="0"/>
-              <a:t>11/21/2022</a:t>
+              <a:t>11/22/2022</a:t>
             </a:fld>
             <a:endParaRPr lang="en-US"/>
           </a:p>
@@ -1821,7 +1821,7 @@
           <a:p>
             <a:fld id="{C5164158-0CE9-4349-B3F5-2F2E57F0D0CB}" type="datetimeFigureOut">
               <a:rPr lang="en-US" smtClean="0"/>
-              <a:t>11/21/2022</a:t>
+              <a:t>11/22/2022</a:t>
             </a:fld>
             <a:endParaRPr lang="en-US"/>
           </a:p>
@@ -2098,7 +2098,7 @@
           <a:p>
             <a:fld id="{C5164158-0CE9-4349-B3F5-2F2E57F0D0CB}" type="datetimeFigureOut">
               <a:rPr lang="en-US" smtClean="0"/>
-              <a:t>11/21/2022</a:t>
+              <a:t>11/22/2022</a:t>
             </a:fld>
             <a:endParaRPr lang="en-US"/>
           </a:p>
@@ -2355,7 +2355,7 @@
           <a:p>
             <a:fld id="{C5164158-0CE9-4349-B3F5-2F2E57F0D0CB}" type="datetimeFigureOut">
               <a:rPr lang="en-US" smtClean="0"/>
-              <a:t>11/21/2022</a:t>
+              <a:t>11/22/2022</a:t>
             </a:fld>
             <a:endParaRPr lang="en-US"/>
           </a:p>
@@ -2568,7 +2568,7 @@
           <a:p>
             <a:fld id="{C5164158-0CE9-4349-B3F5-2F2E57F0D0CB}" type="datetimeFigureOut">
               <a:rPr lang="en-US" smtClean="0"/>
-              <a:t>11/21/2022</a:t>
+              <a:t>11/22/2022</a:t>
             </a:fld>
             <a:endParaRPr lang="en-US"/>
           </a:p>
@@ -3631,7 +3631,7 @@
                 </a:solidFill>
                 <a:latin typeface="Calibri" panose="020F0502020204030204" pitchFamily="34" charset="0"/>
               </a:rPr>
-              <a:t>Post-teaching</a:t>
+              <a:t>Post-teaching phase</a:t>
             </a:r>
           </a:p>
         </p:txBody>
@@ -4795,8 +4795,8 @@
         </p:nvSpPr>
         <p:spPr>
           <a:xfrm>
-            <a:off x="2700030" y="2159538"/>
-            <a:ext cx="635000" cy="155025"/>
+            <a:off x="2700030" y="2152412"/>
+            <a:ext cx="735144" cy="169277"/>
           </a:xfrm>
           <a:prstGeom prst="rect">
             <a:avLst/>
@@ -4810,7 +4810,7 @@
           <a:lstStyle/>
           <a:p>
             <a:r>
-              <a:rPr lang="en-US" sz="1000" spc="-4" dirty="0">
+              <a:rPr lang="en-US" sz="1100" spc="-4" dirty="0">
                 <a:latin typeface="Calibri" panose="020F0502020204030204" pitchFamily="34" charset="0"/>
               </a:rPr>
               <a:t>lesson start </a:t>
@@ -4869,8 +4869,8 @@
         </p:nvSpPr>
         <p:spPr>
           <a:xfrm>
-            <a:off x="956215" y="2300481"/>
-            <a:ext cx="1092684" cy="153888"/>
+            <a:off x="956215" y="2292787"/>
+            <a:ext cx="1092684" cy="169277"/>
           </a:xfrm>
           <a:prstGeom prst="rect">
             <a:avLst/>
@@ -4885,7 +4885,7 @@
           <a:p>
             <a:pPr algn="ctr"/>
             <a:r>
-              <a:rPr lang="en-US" sz="1000" spc="-6" dirty="0">
+              <a:rPr lang="en-US" sz="1100" spc="-6" dirty="0">
                 <a:latin typeface="Calibri" panose="020F0502020204030204" pitchFamily="34" charset="0"/>
               </a:rPr>
               <a:t>put on watch</a:t>
@@ -4905,8 +4905,8 @@
         </p:nvSpPr>
         <p:spPr>
           <a:xfrm>
-            <a:off x="10894554" y="1745640"/>
-            <a:ext cx="1033014" cy="153888"/>
+            <a:off x="10894554" y="1741793"/>
+            <a:ext cx="1033014" cy="161583"/>
           </a:xfrm>
           <a:prstGeom prst="rect">
             <a:avLst/>
@@ -4921,7 +4921,7 @@
           <a:p>
             <a:pPr algn="ctr"/>
             <a:r>
-              <a:rPr lang="en-US" sz="1000" spc="-4" dirty="0">
+              <a:rPr lang="en-US" sz="1050" spc="-4" dirty="0">
                 <a:latin typeface="Calibri" panose="020F0502020204030204" pitchFamily="34" charset="0"/>
               </a:rPr>
               <a:t>subject leaving</a:t>
@@ -4941,8 +4941,8 @@
         </p:nvSpPr>
         <p:spPr>
           <a:xfrm>
-            <a:off x="6812800" y="1556896"/>
-            <a:ext cx="1121794" cy="153888"/>
+            <a:off x="6812800" y="1549202"/>
+            <a:ext cx="1121794" cy="169277"/>
           </a:xfrm>
           <a:prstGeom prst="rect">
             <a:avLst/>
@@ -4956,7 +4956,7 @@
           <a:lstStyle/>
           <a:p>
             <a:r>
-              <a:rPr lang="en-US" sz="1000" spc="-6" dirty="0">
+              <a:rPr lang="en-US" sz="1100" spc="-6" dirty="0">
                 <a:latin typeface="Calibri" panose="020F0502020204030204" pitchFamily="34" charset="0"/>
               </a:rPr>
               <a:t>interview start</a:t>
@@ -5893,8 +5893,8 @@
         </p:nvSpPr>
         <p:spPr>
           <a:xfrm>
-            <a:off x="4233169" y="2159538"/>
-            <a:ext cx="635000" cy="155025"/>
+            <a:off x="4233169" y="2152412"/>
+            <a:ext cx="635000" cy="169277"/>
           </a:xfrm>
           <a:prstGeom prst="rect">
             <a:avLst/>
@@ -5908,7 +5908,7 @@
           <a:lstStyle/>
           <a:p>
             <a:r>
-              <a:rPr lang="en-US" sz="1000" spc="-4" dirty="0">
+              <a:rPr lang="en-US" sz="1100" spc="-4" dirty="0">
                 <a:latin typeface="Calibri" panose="020F0502020204030204" pitchFamily="34" charset="0"/>
               </a:rPr>
               <a:t>lesson end </a:t>
@@ -6054,8 +6054,8 @@
         </p:nvSpPr>
         <p:spPr>
           <a:xfrm>
-            <a:off x="8235246" y="1535245"/>
-            <a:ext cx="1121794" cy="153888"/>
+            <a:off x="8235246" y="1527551"/>
+            <a:ext cx="1121794" cy="169277"/>
           </a:xfrm>
           <a:prstGeom prst="rect">
             <a:avLst/>
@@ -6069,7 +6069,7 @@
           <a:lstStyle/>
           <a:p>
             <a:r>
-              <a:rPr lang="en-US" sz="1000" spc="-6" dirty="0">
+              <a:rPr lang="en-US" sz="1100" spc="-6" dirty="0">
                 <a:latin typeface="Calibri" panose="020F0502020204030204" pitchFamily="34" charset="0"/>
               </a:rPr>
               <a:t>interview end</a:t>
@@ -6455,8 +6455,8 @@
         </p:nvSpPr>
         <p:spPr>
           <a:xfrm>
-            <a:off x="9786847" y="2247077"/>
-            <a:ext cx="1092684" cy="153888"/>
+            <a:off x="9786847" y="2239383"/>
+            <a:ext cx="1092684" cy="169277"/>
           </a:xfrm>
           <a:prstGeom prst="rect">
             <a:avLst/>
@@ -6471,7 +6471,7 @@
           <a:p>
             <a:pPr algn="ctr"/>
             <a:r>
-              <a:rPr lang="en-US" sz="1000" spc="-6" dirty="0">
+              <a:rPr lang="en-US" sz="1100" spc="-6" dirty="0">
                 <a:latin typeface="Calibri" panose="020F0502020204030204" pitchFamily="34" charset="0"/>
               </a:rPr>
               <a:t>put off watch</a:t>
@@ -7471,8 +7471,8 @@
         </p:nvSpPr>
         <p:spPr>
           <a:xfrm>
-            <a:off x="5153761" y="1571271"/>
-            <a:ext cx="1121794" cy="153888"/>
+            <a:off x="5153761" y="1544471"/>
+            <a:ext cx="1121794" cy="169277"/>
           </a:xfrm>
           <a:prstGeom prst="rect">
             <a:avLst/>
@@ -7486,7 +7486,7 @@
           <a:lstStyle/>
           <a:p>
             <a:r>
-              <a:rPr lang="en-US" sz="1000" spc="-6" dirty="0">
+              <a:rPr lang="en-US" sz="1100" spc="-6" dirty="0">
                 <a:latin typeface="Calibri" panose="020F0502020204030204" pitchFamily="34" charset="0"/>
               </a:rPr>
               <a:t>questionnaire start</a:t>
@@ -7512,8 +7512,8 @@
         </p:nvSpPr>
         <p:spPr>
           <a:xfrm>
-            <a:off x="5639898" y="1745640"/>
-            <a:ext cx="1121794" cy="153888"/>
+            <a:off x="5604386" y="1737946"/>
+            <a:ext cx="1121794" cy="169277"/>
           </a:xfrm>
           <a:prstGeom prst="rect">
             <a:avLst/>
@@ -7527,7 +7527,7 @@
           <a:lstStyle/>
           <a:p>
             <a:r>
-              <a:rPr lang="en-US" sz="1000" spc="-6" dirty="0">
+              <a:rPr lang="en-US" sz="1100" spc="-6" dirty="0">
                 <a:latin typeface="Calibri" panose="020F0502020204030204" pitchFamily="34" charset="0"/>
               </a:rPr>
               <a:t>questionnaire end</a:t>
@@ -7673,8 +7673,8 @@
         </p:nvSpPr>
         <p:spPr>
           <a:xfrm>
-            <a:off x="9310099" y="2071932"/>
-            <a:ext cx="1121794" cy="153888"/>
+            <a:off x="9310099" y="2064238"/>
+            <a:ext cx="1121794" cy="169277"/>
           </a:xfrm>
           <a:prstGeom prst="rect">
             <a:avLst/>
@@ -7688,7 +7688,7 @@
           <a:lstStyle/>
           <a:p>
             <a:r>
-              <a:rPr lang="en-US" sz="1000" spc="-6" dirty="0">
+              <a:rPr lang="en-US" sz="1100" spc="-6" dirty="0">
                 <a:latin typeface="Calibri" panose="020F0502020204030204" pitchFamily="34" charset="0"/>
               </a:rPr>
               <a:t>questionnaire start</a:t>

</xml_diff>